<commit_message>
WIP Poster & Video
</commit_message>
<xml_diff>
--- a/doc_source/Poster.pptx
+++ b/doc_source/Poster.pptx
@@ -939,7 +939,7 @@
         <p:spPr>
           <a:xfrm>
             <a:off x="898776" y="875400"/>
-            <a:ext cx="8845847" cy="16312158"/>
+            <a:ext cx="8845847" cy="15742771"/>
           </a:xfrm>
           <a:prstGeom prst="rect">
             <a:avLst/>
@@ -991,7 +991,7 @@
                 </a:solidFill>
                 <a:latin typeface="Lucida Sans" pitchFamily="34" charset="0"/>
               </a:rPr>
-              <a:t>Billard ist eine Sportart, die ein gewisses Verständnis von Physik, strategisches Denken und eine ruhige Hand erfordert. Für Anfänger ist es schwierig, in einer Spielsituation geeignete Stösse zu finden, den passenden auszuwählen und korrekt auszuführen.</a:t>
+              <a:t>Billard ist eine Sportart, die strategisches Denken, ein gewisses Verständnis von Physik und eine ruhige Hand erfordert. Für Anfänger ist es schwierig, in einer Spielsituation geeignete Stösse zu finden, den passenden auszuwählen und korrekt auszuführen.</a:t>
             </a:r>
           </a:p>
           <a:p>
@@ -1036,7 +1036,7 @@
                 </a:solidFill>
                 <a:latin typeface="Lucida Sans" pitchFamily="34" charset="0"/>
               </a:rPr>
-              <a:t>Beim Billard muss sich der Spieler mögliche Stösse vorstellen und die Stärke und den Winkel, mit dem die weisse Kugel angestossen werden soll, abschätzen. Was nach dem Stoss passiert, muss sich der Spieler aufgrund seiner Erfahrung im Spiel vorstellen.</a:t>
+              <a:t>Beim Billard muss sich der Spieler mögliche Stösse überlegen und die Stärke und den Winkel, mit dem die weisse Kugel angestossen werden soll, abschätzen. Was nach dem Stoss passiert, muss sich der Spieler aufgrund seiner Erfahrung im Spiel vorstellen.</a:t>
             </a:r>
           </a:p>
           <a:p>
@@ -1820,7 +1820,7 @@
                 </a:solidFill>
                 <a:latin typeface="Lucida Sans" pitchFamily="34" charset="0"/>
               </a:rPr>
-              <a:t>Im Infinity-Spielmodus erhält der Spieler automatisch Vorschläge. Ein möglicher Stoss wird animiert angezeigt, der Spieler führt diesen mehr oder weniger erfolgreich aus, und erhält einen neuen Vorschlag so bald alle Kugeln stillstehen. </a:t>
+              <a:t>Im Infinity-Spielmodus erhält der Spieler automatisch Vorschläge. Ein möglicher Stoss wird animiert angezeigt, der Spieler führt diesen mehr oder weniger erfolgreich aus, und erhält einen neuen Vorschlag, sobald alle Kugeln stillstehen. </a:t>
             </a:r>
           </a:p>
           <a:p>
@@ -2477,37 +2477,6 @@
 </file>
 
 <file path=customXml/item1.xml><?xml version="1.0" encoding="utf-8"?>
-<LongProperties xmlns="http://schemas.microsoft.com/office/2006/metadata/longProperties"/>
-</file>
-
-<file path=customXml/item2.xml><?xml version="1.0" encoding="utf-8"?>
-<p:properties xmlns:p="http://schemas.microsoft.com/office/2006/metadata/properties" xmlns:xsi="http://www.w3.org/2001/XMLSchema-instance" xmlns:pc="http://schemas.microsoft.com/office/infopath/2007/PartnerControls">
-  <documentManagement>
-    <BfhIntranetDepartmentText xmlns="63c724b1-652e-424f-8d99-4ee509067280">
-      <Terms xmlns="http://schemas.microsoft.com/office/infopath/2007/PartnerControls">
-        <TermInfo xmlns="http://schemas.microsoft.com/office/infopath/2007/PartnerControls">
-          <TermName xmlns="http://schemas.microsoft.com/office/infopath/2007/PartnerControls">Vorlage</TermName>
-          <TermId xmlns="http://schemas.microsoft.com/office/infopath/2007/PartnerControls">de1a6d3c-ac6a-4b34-8edd-308eb81066db</TermId>
-        </TermInfo>
-      </Terms>
-    </BfhIntranetDepartmentText>
-    <TaxCatchAll xmlns="2551ef7e-3b29-44d1-a8ad-ef34c26bfc60">
-      <Value>241</Value>
-    </TaxCatchAll>
-  </documentManagement>
-</p:properties>
-</file>
-
-<file path=customXml/item3.xml><?xml version="1.0" encoding="utf-8"?>
-<?mso-contentType ?>
-<FormTemplates xmlns="http://schemas.microsoft.com/sharepoint/v3/contenttype/forms">
-  <Display>DocumentLibraryForm</Display>
-  <Edit>DocumentLibraryForm</Edit>
-  <New>DocumentLibraryForm</New>
-</FormTemplates>
-</file>
-
-<file path=customXml/item4.xml><?xml version="1.0" encoding="utf-8"?>
 <ct:contentTypeSchema xmlns:ct="http://schemas.microsoft.com/office/2006/metadata/contentType" xmlns:ma="http://schemas.microsoft.com/office/2006/metadata/properties/metaAttributes" ct:_="" ma:_="" ma:contentTypeName="BFH Document" ma:contentTypeID="0x0101009127C3B567804923A8661E062BBD8EF500562C9D82744B284A86093F1D9B579BDC" ma:contentTypeVersion="2" ma:contentTypeDescription="Ein neues Dokument erstellen." ma:contentTypeScope="" ma:versionID="9c45b5bf27c78835ceac1d8ed0ad849b">
   <xsd:schema xmlns:xsd="http://www.w3.org/2001/XMLSchema" xmlns:xs="http://www.w3.org/2001/XMLSchema" xmlns:p="http://schemas.microsoft.com/office/2006/metadata/properties" xmlns:ns2="63c724b1-652e-424f-8d99-4ee509067280" xmlns:ns3="2551ef7e-3b29-44d1-a8ad-ef34c26bfc60" targetNamespace="http://schemas.microsoft.com/office/2006/metadata/properties" ma:root="true" ma:fieldsID="77ddedd9f4909d73cfb737d3d691d0f9" ns2:_="" ns3:_="">
     <xsd:import namespace="63c724b1-652e-424f-8d99-4ee509067280"/>
@@ -2652,15 +2621,65 @@
 </ct:contentTypeSchema>
 </file>
 
+<file path=customXml/item2.xml><?xml version="1.0" encoding="utf-8"?>
+<?mso-contentType ?>
+<FormTemplates xmlns="http://schemas.microsoft.com/sharepoint/v3/contenttype/forms">
+  <Display>DocumentLibraryForm</Display>
+  <Edit>DocumentLibraryForm</Edit>
+  <New>DocumentLibraryForm</New>
+</FormTemplates>
+</file>
+
+<file path=customXml/item3.xml><?xml version="1.0" encoding="utf-8"?>
+<p:properties xmlns:p="http://schemas.microsoft.com/office/2006/metadata/properties" xmlns:xsi="http://www.w3.org/2001/XMLSchema-instance" xmlns:pc="http://schemas.microsoft.com/office/infopath/2007/PartnerControls">
+  <documentManagement>
+    <BfhIntranetDepartmentText xmlns="63c724b1-652e-424f-8d99-4ee509067280">
+      <Terms xmlns="http://schemas.microsoft.com/office/infopath/2007/PartnerControls">
+        <TermInfo xmlns="http://schemas.microsoft.com/office/infopath/2007/PartnerControls">
+          <TermName xmlns="http://schemas.microsoft.com/office/infopath/2007/PartnerControls">Vorlage</TermName>
+          <TermId xmlns="http://schemas.microsoft.com/office/infopath/2007/PartnerControls">de1a6d3c-ac6a-4b34-8edd-308eb81066db</TermId>
+        </TermInfo>
+      </Terms>
+    </BfhIntranetDepartmentText>
+    <TaxCatchAll xmlns="2551ef7e-3b29-44d1-a8ad-ef34c26bfc60">
+      <Value>241</Value>
+    </TaxCatchAll>
+  </documentManagement>
+</p:properties>
+</file>
+
+<file path=customXml/item4.xml><?xml version="1.0" encoding="utf-8"?>
+<LongProperties xmlns="http://schemas.microsoft.com/office/2006/metadata/longProperties"/>
+</file>
+
 <file path=customXml/itemProps1.xml><?xml version="1.0" encoding="utf-8"?>
-<ds:datastoreItem xmlns:ds="http://schemas.openxmlformats.org/officeDocument/2006/customXml" ds:itemID="{34ACECAE-8DDC-4218-ADDE-80828E100BF5}">
+<ds:datastoreItem xmlns:ds="http://schemas.openxmlformats.org/officeDocument/2006/customXml" ds:itemID="{064F56C1-3E03-4158-81FF-45AFD11405FB}">
   <ds:schemaRefs>
-    <ds:schemaRef ds:uri="http://schemas.microsoft.com/office/2006/metadata/longProperties"/>
+    <ds:schemaRef ds:uri="http://schemas.microsoft.com/office/2006/metadata/contentType"/>
+    <ds:schemaRef ds:uri="http://schemas.microsoft.com/office/2006/metadata/properties/metaAttributes"/>
+    <ds:schemaRef ds:uri="http://www.w3.org/2001/XMLSchema"/>
+    <ds:schemaRef ds:uri="http://schemas.microsoft.com/office/2006/metadata/properties"/>
+    <ds:schemaRef ds:uri="63c724b1-652e-424f-8d99-4ee509067280"/>
+    <ds:schemaRef ds:uri="2551ef7e-3b29-44d1-a8ad-ef34c26bfc60"/>
+    <ds:schemaRef ds:uri="http://schemas.microsoft.com/office/2006/documentManagement/types"/>
+    <ds:schemaRef ds:uri="http://schemas.microsoft.com/office/infopath/2007/PartnerControls"/>
+    <ds:schemaRef ds:uri="http://schemas.openxmlformats.org/package/2006/metadata/core-properties"/>
+    <ds:schemaRef ds:uri="http://purl.org/dc/elements/1.1/"/>
+    <ds:schemaRef ds:uri="http://purl.org/dc/terms/"/>
+    <ds:schemaRef ds:uri="http://schemas.microsoft.com/internal/obd"/>
   </ds:schemaRefs>
 </ds:datastoreItem>
 </file>
 
 <file path=customXml/itemProps2.xml><?xml version="1.0" encoding="utf-8"?>
+<ds:datastoreItem xmlns:ds="http://schemas.openxmlformats.org/officeDocument/2006/customXml" ds:itemID="{47870AFC-B140-4E73-B0E2-054A74E7EB25}">
+  <ds:schemaRefs>
+    <ds:schemaRef ds:uri="http://schemas.microsoft.com/sharepoint/v3/contenttype/forms"/>
+  </ds:schemaRefs>
+</ds:datastoreItem>
+</file>
+
+<file path=customXml/itemProps3.xml><?xml version="1.0" encoding="utf-8"?>
 <ds:datastoreItem xmlns:ds="http://schemas.openxmlformats.org/officeDocument/2006/customXml" ds:itemID="{12310AE4-98C2-4A3E-BE75-5A8AB8823A32}">
   <ds:schemaRefs>
     <ds:schemaRef ds:uri="2551ef7e-3b29-44d1-a8ad-ef34c26bfc60"/>
@@ -2677,29 +2696,10 @@
 </ds:datastoreItem>
 </file>
 
-<file path=customXml/itemProps3.xml><?xml version="1.0" encoding="utf-8"?>
-<ds:datastoreItem xmlns:ds="http://schemas.openxmlformats.org/officeDocument/2006/customXml" ds:itemID="{47870AFC-B140-4E73-B0E2-054A74E7EB25}">
+<file path=customXml/itemProps4.xml><?xml version="1.0" encoding="utf-8"?>
+<ds:datastoreItem xmlns:ds="http://schemas.openxmlformats.org/officeDocument/2006/customXml" ds:itemID="{34ACECAE-8DDC-4218-ADDE-80828E100BF5}">
   <ds:schemaRefs>
-    <ds:schemaRef ds:uri="http://schemas.microsoft.com/sharepoint/v3/contenttype/forms"/>
-  </ds:schemaRefs>
-</ds:datastoreItem>
-</file>
-
-<file path=customXml/itemProps4.xml><?xml version="1.0" encoding="utf-8"?>
-<ds:datastoreItem xmlns:ds="http://schemas.openxmlformats.org/officeDocument/2006/customXml" ds:itemID="{064F56C1-3E03-4158-81FF-45AFD11405FB}">
-  <ds:schemaRefs>
-    <ds:schemaRef ds:uri="http://schemas.microsoft.com/office/2006/metadata/contentType"/>
-    <ds:schemaRef ds:uri="http://schemas.microsoft.com/office/2006/metadata/properties/metaAttributes"/>
-    <ds:schemaRef ds:uri="http://www.w3.org/2001/XMLSchema"/>
-    <ds:schemaRef ds:uri="http://schemas.microsoft.com/office/2006/metadata/properties"/>
-    <ds:schemaRef ds:uri="63c724b1-652e-424f-8d99-4ee509067280"/>
-    <ds:schemaRef ds:uri="2551ef7e-3b29-44d1-a8ad-ef34c26bfc60"/>
-    <ds:schemaRef ds:uri="http://schemas.microsoft.com/office/2006/documentManagement/types"/>
-    <ds:schemaRef ds:uri="http://schemas.microsoft.com/office/infopath/2007/PartnerControls"/>
-    <ds:schemaRef ds:uri="http://schemas.openxmlformats.org/package/2006/metadata/core-properties"/>
-    <ds:schemaRef ds:uri="http://purl.org/dc/elements/1.1/"/>
-    <ds:schemaRef ds:uri="http://purl.org/dc/terms/"/>
-    <ds:schemaRef ds:uri="http://schemas.microsoft.com/internal/obd"/>
+    <ds:schemaRef ds:uri="http://schemas.microsoft.com/office/2006/metadata/longProperties"/>
   </ds:schemaRefs>
 </ds:datastoreItem>
 </file>
</xml_diff>